<commit_message>
Added final video (IraborPricess_SullinsBenjamin.mp4) Added final poser (IraborPricess_SullinsBenjamin.pdf)
Other files are subsets used for generation of the two files above.
Signed-off-by: Benjamin Sullins <bensullins1@gmail.com>
</commit_message>
<xml_diff>
--- a/docs/posterpdfv4.pptx
+++ b/docs/posterpdfv4.pptx
@@ -139,7 +139,7 @@
   </p:defaultTextStyle>
   <p:extLst>
     <p:ext uri="{EFAFB233-063F-42B5-8137-9DF3F51BA10A}">
-      <p15:sldGuideLst xmlns:p15="http://schemas.microsoft.com/office/powerpoint/2012/main" xmlns="">
+      <p15:sldGuideLst xmlns="" xmlns:p15="http://schemas.microsoft.com/office/powerpoint/2012/main">
         <p15:guide id="1" orient="horz">
           <p15:clr>
             <a:srgbClr val="A4A3A4"/>
@@ -375,7 +375,7 @@
     </p:spTree>
     <p:extLst>
       <p:ext uri="{BB962C8B-B14F-4D97-AF65-F5344CB8AC3E}">
-        <p14:creationId xmlns:p14="http://schemas.microsoft.com/office/powerpoint/2010/main" xmlns="" val="1674209424"/>
+        <p14:creationId xmlns:p14="http://schemas.microsoft.com/office/powerpoint/2010/main" val="1674209424"/>
       </p:ext>
     </p:extLst>
   </p:cSld>
@@ -729,7 +729,7 @@
     </p:spTree>
     <p:extLst>
       <p:ext uri="{BB962C8B-B14F-4D97-AF65-F5344CB8AC3E}">
-        <p14:creationId xmlns:p14="http://schemas.microsoft.com/office/powerpoint/2010/main" xmlns="" val="3547943380"/>
+        <p14:creationId xmlns:p14="http://schemas.microsoft.com/office/powerpoint/2010/main" val="3547943380"/>
       </p:ext>
     </p:extLst>
   </p:cSld>
@@ -914,7 +914,7 @@
     </p:spTree>
     <p:extLst>
       <p:ext uri="{BB962C8B-B14F-4D97-AF65-F5344CB8AC3E}">
-        <p14:creationId xmlns:p14="http://schemas.microsoft.com/office/powerpoint/2010/main" xmlns="" val="2476685993"/>
+        <p14:creationId xmlns:p14="http://schemas.microsoft.com/office/powerpoint/2010/main" val="2476685993"/>
       </p:ext>
     </p:extLst>
   </p:cSld>
@@ -1102,7 +1102,7 @@
     </p:spTree>
     <p:extLst>
       <p:ext uri="{BB962C8B-B14F-4D97-AF65-F5344CB8AC3E}">
-        <p14:creationId xmlns:p14="http://schemas.microsoft.com/office/powerpoint/2010/main" xmlns="" val="3737768642"/>
+        <p14:creationId xmlns:p14="http://schemas.microsoft.com/office/powerpoint/2010/main" val="3737768642"/>
       </p:ext>
     </p:extLst>
   </p:cSld>
@@ -1280,7 +1280,7 @@
     </p:spTree>
     <p:extLst>
       <p:ext uri="{BB962C8B-B14F-4D97-AF65-F5344CB8AC3E}">
-        <p14:creationId xmlns:p14="http://schemas.microsoft.com/office/powerpoint/2010/main" xmlns="" val="905339179"/>
+        <p14:creationId xmlns:p14="http://schemas.microsoft.com/office/powerpoint/2010/main" val="905339179"/>
       </p:ext>
     </p:extLst>
   </p:cSld>
@@ -1534,7 +1534,7 @@
     </p:spTree>
     <p:extLst>
       <p:ext uri="{BB962C8B-B14F-4D97-AF65-F5344CB8AC3E}">
-        <p14:creationId xmlns:p14="http://schemas.microsoft.com/office/powerpoint/2010/main" xmlns="" val="495773809"/>
+        <p14:creationId xmlns:p14="http://schemas.microsoft.com/office/powerpoint/2010/main" val="495773809"/>
       </p:ext>
     </p:extLst>
   </p:cSld>
@@ -1830,7 +1830,7 @@
     </p:spTree>
     <p:extLst>
       <p:ext uri="{BB962C8B-B14F-4D97-AF65-F5344CB8AC3E}">
-        <p14:creationId xmlns:p14="http://schemas.microsoft.com/office/powerpoint/2010/main" xmlns="" val="1415558213"/>
+        <p14:creationId xmlns:p14="http://schemas.microsoft.com/office/powerpoint/2010/main" val="1415558213"/>
       </p:ext>
     </p:extLst>
   </p:cSld>
@@ -2265,7 +2265,7 @@
     </p:spTree>
     <p:extLst>
       <p:ext uri="{BB962C8B-B14F-4D97-AF65-F5344CB8AC3E}">
-        <p14:creationId xmlns:p14="http://schemas.microsoft.com/office/powerpoint/2010/main" xmlns="" val="1343159601"/>
+        <p14:creationId xmlns:p14="http://schemas.microsoft.com/office/powerpoint/2010/main" val="1343159601"/>
       </p:ext>
     </p:extLst>
   </p:cSld>
@@ -2391,7 +2391,7 @@
     </p:spTree>
     <p:extLst>
       <p:ext uri="{BB962C8B-B14F-4D97-AF65-F5344CB8AC3E}">
-        <p14:creationId xmlns:p14="http://schemas.microsoft.com/office/powerpoint/2010/main" xmlns="" val="2523206898"/>
+        <p14:creationId xmlns:p14="http://schemas.microsoft.com/office/powerpoint/2010/main" val="2523206898"/>
       </p:ext>
     </p:extLst>
   </p:cSld>
@@ -2528,7 +2528,7 @@
     </p:spTree>
     <p:extLst>
       <p:ext uri="{BB962C8B-B14F-4D97-AF65-F5344CB8AC3E}">
-        <p14:creationId xmlns:p14="http://schemas.microsoft.com/office/powerpoint/2010/main" xmlns="" val="1448708100"/>
+        <p14:creationId xmlns:p14="http://schemas.microsoft.com/office/powerpoint/2010/main" val="1448708100"/>
       </p:ext>
     </p:extLst>
   </p:cSld>
@@ -2813,7 +2813,7 @@
     </p:spTree>
     <p:extLst>
       <p:ext uri="{BB962C8B-B14F-4D97-AF65-F5344CB8AC3E}">
-        <p14:creationId xmlns:p14="http://schemas.microsoft.com/office/powerpoint/2010/main" xmlns="" val="3929415606"/>
+        <p14:creationId xmlns:p14="http://schemas.microsoft.com/office/powerpoint/2010/main" val="3929415606"/>
       </p:ext>
     </p:extLst>
   </p:cSld>
@@ -3074,7 +3074,7 @@
     </p:spTree>
     <p:extLst>
       <p:ext uri="{BB962C8B-B14F-4D97-AF65-F5344CB8AC3E}">
-        <p14:creationId xmlns:p14="http://schemas.microsoft.com/office/powerpoint/2010/main" xmlns="" val="260636103"/>
+        <p14:creationId xmlns:p14="http://schemas.microsoft.com/office/powerpoint/2010/main" val="260636103"/>
       </p:ext>
     </p:extLst>
   </p:cSld>
@@ -3331,7 +3331,7 @@
     </p:spTree>
     <p:extLst>
       <p:ext uri="{BB962C8B-B14F-4D97-AF65-F5344CB8AC3E}">
-        <p14:creationId xmlns:p14="http://schemas.microsoft.com/office/powerpoint/2010/main" xmlns="" val="2058180288"/>
+        <p14:creationId xmlns:p14="http://schemas.microsoft.com/office/powerpoint/2010/main" val="2058180288"/>
       </p:ext>
     </p:extLst>
   </p:cSld>
@@ -3706,29 +3706,7 @@
                 </a:solidFill>
                 <a:latin typeface="Arial Black" pitchFamily="34" charset="0"/>
               </a:rPr>
-              <a:t>Benjamin </a:t>
-            </a:r>
-            <a:r>
-              <a:rPr lang="en-US" sz="4000" b="1" dirty="0" err="1" smtClean="0">
-                <a:solidFill>
-                  <a:schemeClr val="accent6">
-                    <a:lumMod val="50000"/>
-                  </a:schemeClr>
-                </a:solidFill>
-                <a:latin typeface="Arial Black" pitchFamily="34" charset="0"/>
-              </a:rPr>
-              <a:t>Sullins</a:t>
-            </a:r>
-            <a:r>
-              <a:rPr lang="en-US" sz="4000" b="1" dirty="0" smtClean="0">
-                <a:solidFill>
-                  <a:schemeClr val="accent6">
-                    <a:lumMod val="50000"/>
-                  </a:schemeClr>
-                </a:solidFill>
-                <a:latin typeface="Arial Black" pitchFamily="34" charset="0"/>
-              </a:rPr>
-              <a:t>, Princess </a:t>
+              <a:t>Benjamin Sullins, Princess </a:t>
             </a:r>
             <a:r>
               <a:rPr lang="en-US" sz="4000" b="1" dirty="0" err="1" smtClean="0">
@@ -3750,7 +3728,18 @@
                 </a:solidFill>
                 <a:latin typeface="Arial Black" pitchFamily="34" charset="0"/>
               </a:rPr>
-              <a:t>, Digital Image Processing ECE6258  ·</a:t>
+              <a:t>, Digital Image Processing </a:t>
+            </a:r>
+            <a:r>
+              <a:rPr lang="en-US" sz="4000" b="1" dirty="0" smtClean="0">
+                <a:solidFill>
+                  <a:schemeClr val="accent6">
+                    <a:lumMod val="50000"/>
+                  </a:schemeClr>
+                </a:solidFill>
+                <a:latin typeface="Arial Black" pitchFamily="34" charset="0"/>
+              </a:rPr>
+              <a:t>ECE6258</a:t>
             </a:r>
             <a:endParaRPr lang="en-US" sz="4000" b="1" dirty="0">
               <a:solidFill>
@@ -3795,74 +3784,33 @@
           <a:p>
             <a:r>
               <a:rPr lang="en-US" sz="2400" dirty="0" smtClean="0"/>
-              <a:t>Sign </a:t>
-            </a:r>
+              <a:t>Sign language provides a means of communicating with others through a set of hand motions. Large portions of the population know little or none of the language, making communicating between two individuals cumbersome. A method of translating the sign language characters to readable text aids in bridging the communication gap between those individuals.</a:t>
+            </a:r>
+          </a:p>
+          <a:p>
             <a:r>
               <a:rPr lang="en-US" sz="2400" dirty="0" smtClean="0"/>
-              <a:t>language provides a means of communicating with others through a set of hand motions. Large portions of the population know little or none of the language, making communicating between two individuals cumbersome. A method of translating the sign language characters to readable text aids in bridging the communication gap between those individuals</a:t>
-            </a:r>
+              <a:t>The significant obstacle in developing a system which can perform the language translation lies in the discrimination between multitudes of sign language characters. Previously designed systems focus on an element of the sign language character to help identify what character is being displayed. These elements translate into a feature vector which is pervasive across a number of sign language characters and can aid in discrimination. Some sign language character feature vectors are similar to other characters in the given set. This can introduces error into the discrimination process. The designer is often forced to find another feature vector which can improve the results.</a:t>
+            </a:r>
+          </a:p>
+          <a:p>
             <a:r>
               <a:rPr lang="en-US" sz="2400" dirty="0" smtClean="0"/>
-              <a:t>.</a:t>
-            </a:r>
-            <a:endParaRPr lang="en-US" sz="2400" dirty="0" smtClean="0"/>
-          </a:p>
-          <a:p>
+              <a:t>Instead of finding alternative feature vectors through complicated design methods, a number of easily computed feature vectors can be used in unison to achieve similar results. This </a:t>
+            </a:r>
             <a:r>
               <a:rPr lang="en-US" sz="2400" dirty="0" smtClean="0"/>
-              <a:t>The significant obstacle in developing a system which can perform the language translation lies in the discrimination between multitudes of sign language characters. Previously designed systems focus on an element of the sign language character to help identify what character is being displayed. These elements translate into a feature vector which is pervasive across a number of sign language characters and can aid in discrimination. Some sign language character feature vectors are </a:t>
+              <a:t>design focuses </a:t>
             </a:r>
             <a:r>
               <a:rPr lang="en-US" sz="2400" dirty="0" smtClean="0"/>
-              <a:t>similar to other </a:t>
-            </a:r>
+              <a:t>on computing those simple feature vectors and showing their effectiveness in discriminating between sign language characters when used collectively.</a:t>
+            </a:r>
+          </a:p>
+          <a:p>
             <a:r>
               <a:rPr lang="en-US" sz="2400" dirty="0" smtClean="0"/>
-              <a:t>characters in the given set. </a:t>
-            </a:r>
-            <a:r>
-              <a:rPr lang="en-US" sz="2400" dirty="0" smtClean="0"/>
-              <a:t>This can </a:t>
-            </a:r>
-            <a:r>
-              <a:rPr lang="en-US" sz="2400" dirty="0" smtClean="0"/>
-              <a:t>introduces error into the discrimination </a:t>
-            </a:r>
-            <a:r>
-              <a:rPr lang="en-US" sz="2400" dirty="0" smtClean="0"/>
-              <a:t>process. </a:t>
-            </a:r>
-            <a:r>
-              <a:rPr lang="en-US" sz="2400" dirty="0" smtClean="0"/>
-              <a:t>The designer is often forced to find another feature vector which can improve the </a:t>
-            </a:r>
-            <a:r>
-              <a:rPr lang="en-US" sz="2400" dirty="0" smtClean="0"/>
-              <a:t>results.</a:t>
-            </a:r>
-          </a:p>
-          <a:p>
-            <a:r>
-              <a:rPr lang="en-US" sz="2400" dirty="0" smtClean="0"/>
-              <a:t>Instead of finding alternative feature vectors through complicated design methods, a number of easily computed feature vectors can be used in unison to achieve similar results. This paper focuses on computing those simple feature vectors and showing their effectiveness in discriminating between sign language characters when used collectively</a:t>
-            </a:r>
-            <a:r>
-              <a:rPr lang="en-US" sz="2400" dirty="0" smtClean="0"/>
-              <a:t>.</a:t>
-            </a:r>
-          </a:p>
-          <a:p>
-            <a:r>
-              <a:rPr lang="en-US" sz="2400" dirty="0" smtClean="0"/>
-              <a:t>Sign Language includes a vast number of characters. To reduce the complexity of the overall system, focus is given to the letters of the alphabet (A – </a:t>
-            </a:r>
-            <a:r>
-              <a:rPr lang="en-US" sz="2400" dirty="0" smtClean="0"/>
-              <a:t>Z). </a:t>
-            </a:r>
-            <a:r>
-              <a:rPr lang="en-US" sz="2400" dirty="0" smtClean="0"/>
-              <a:t>Extensions to the existing design can be made to include larger data sets that expand past the alphabet to something much larger.</a:t>
+              <a:t>Sign Language includes a vast number of characters. To reduce the complexity of the overall system, focus is given to the letters of the alphabet (A – Z). Extensions to the existing design can be made to include larger data sets that expand past the alphabet to something much larger.</a:t>
             </a:r>
           </a:p>
           <a:p>
@@ -3905,27 +3853,7 @@
             </a:pPr>
             <a:r>
               <a:rPr lang="en-US" sz="2400" dirty="0" smtClean="0"/>
-              <a:t>Synthetic images of the letters of the English alphabet were collected and designated as the test  image set . </a:t>
-            </a:r>
-            <a:r>
-              <a:rPr lang="en-US" sz="2400" dirty="0" smtClean="0"/>
-              <a:t>Image processing was performed on the test set to resize and convert to binary form. The  sign descriptors are extracted from the binary image. The descriptors extracted include the length , width, orientation, eccentricity and selected Fourier coefficients. The  length and width are used to distinguish between the elongation of the image in the vertical and horizontal direction. The orientation and eccentricity are derivations from the invariant inertial moments of the image. The orientation gives directional information of the sign regardless of the scale  or  rotational position of the sign. Similarly, the eccentricity indicates the roundness . The  sign boundary is approximated as a curve in the complex plane  and the </a:t>
-            </a:r>
-            <a:r>
-              <a:rPr lang="en-US" sz="2400" dirty="0" smtClean="0"/>
-              <a:t> </a:t>
-            </a:r>
-            <a:r>
-              <a:rPr lang="en-US" sz="2400" dirty="0" smtClean="0"/>
-              <a:t>discrete Fourier transform is obtained. The minimum  complex Fourier  coefficients and the coefficients  of the zero frequency, first and maximum harmonic are selected as the spectral descriptors of the image. Other  spatial and spectral features including fingertips and mean </a:t>
-            </a:r>
-            <a:r>
-              <a:rPr lang="en-US" sz="2400" dirty="0" smtClean="0"/>
-              <a:t>F</a:t>
-            </a:r>
-            <a:r>
-              <a:rPr lang="en-US" sz="2400" dirty="0" smtClean="0"/>
-              <a:t>ourier coefficients are also explored.</a:t>
+              <a:t>Synthetic images of the letters of the English alphabet were collected and designated as the test  image set . Image processing was performed on the test set to resize and convert to binary form. The  sign descriptors are extracted from the binary image. The descriptors extracted include the length , width, orientation, eccentricity and selected Fourier coefficients. The  length and width are used to distinguish between the elongation of the image in the vertical and horizontal direction. The orientation and eccentricity are derivations from the invariant inertial moments of the image. The orientation gives directional information of the sign regardless of the scale  or  rotational position of the sign. Similarly, the eccentricity indicates the roundness . The  sign boundary is approximated as a curve in the complex plane  and the  discrete Fourier transform is obtained. The minimum  complex Fourier  coefficients and the coefficients  of the zero frequency, first and maximum harmonic are selected as the spectral descriptors of the image. Other  spatial and spectral features including fingertips and mean Fourier coefficients are also explored.</a:t>
             </a:r>
           </a:p>
           <a:p>
@@ -3975,15 +3903,15 @@
             </a:pPr>
             <a:r>
               <a:rPr lang="en-US" sz="2400" dirty="0" smtClean="0"/>
-              <a:t>The </a:t>
+              <a:t>The classification of alphabetical sign language characters and their translation to readable text is addressed in this </a:t>
             </a:r>
             <a:r>
               <a:rPr lang="en-US" sz="2400" dirty="0" smtClean="0"/>
-              <a:t>classification of alphabetical sign language characters and their translation to readable text is addressed in this paper. The system utilizes a single set of training images and a multitude of extracted feature vectors to aid in classifying a user-defined input sign language character. The extracted feature vectors include length, width, orientation, eccentricity, Fourier domain qualities, and fingertip segmentations. These feature vectors are coupled with a K-Means clustering algorithm to improve the efficiency and accuracy of the system. Each feature vector aids in narrowing down the classification possibilities to improve the overall character estimation results</a:t>
+              <a:t>design. </a:t>
             </a:r>
             <a:r>
               <a:rPr lang="en-US" sz="2400" dirty="0" smtClean="0"/>
-              <a:t>.</a:t>
+              <a:t>The system utilizes a single set of training images and a multitude of extracted feature vectors to aid in classifying a user-defined input sign language character. The extracted feature vectors include length, width, orientation, eccentricity, Fourier domain qualities, and fingertip segmentations. These feature vectors are coupled with a K-Means clustering algorithm to improve the efficiency and accuracy of the system. Each feature vector aids in narrowing down the classification possibilities to improve the overall character estimation results.</a:t>
             </a:r>
             <a:endParaRPr lang="en-US" sz="2400" i="1" dirty="0" smtClean="0"/>
           </a:p>
@@ -4131,14 +4059,14 @@
           </a:ln>
           <a:extLst>
             <a:ext uri="{909E8E84-426E-40DD-AFC4-6F175D3DCCD1}">
-              <a14:hiddenFill xmlns:a14="http://schemas.microsoft.com/office/drawing/2010/main" xmlns="">
+              <a14:hiddenFill xmlns:a14="http://schemas.microsoft.com/office/drawing/2010/main">
                 <a:solidFill>
                   <a:srgbClr val="FFFFFF"/>
                 </a:solidFill>
               </a14:hiddenFill>
             </a:ext>
             <a:ext uri="{91240B29-F687-4F45-9708-019B960494DF}">
-              <a14:hiddenLine xmlns:a14="http://schemas.microsoft.com/office/drawing/2010/main" xmlns="" w="9525">
+              <a14:hiddenLine xmlns:a14="http://schemas.microsoft.com/office/drawing/2010/main" w="9525">
                 <a:solidFill>
                   <a:srgbClr val="000000"/>
                 </a:solidFill>
@@ -4346,11 +4274,7 @@
           <a:p>
             <a:r>
               <a:rPr lang="en-US" sz="2400" dirty="0" smtClean="0"/>
-              <a:t>(</a:t>
-            </a:r>
-            <a:r>
-              <a:rPr lang="en-US" sz="2400" dirty="0" smtClean="0"/>
-              <a:t>[1] Johannes </a:t>
+              <a:t>([1] Johannes </a:t>
             </a:r>
             <a:r>
               <a:rPr lang="en-US" sz="2400" dirty="0" err="1" smtClean="0"/>
@@ -4364,107 +4288,97 @@
           <a:p>
             <a:r>
               <a:rPr lang="en-US" sz="2400" dirty="0" smtClean="0"/>
-              <a:t>SimpleImageAnalysisbyMoments.pdf. Accessed: Nov. 27, 2016</a:t>
-            </a:r>
+              <a:t>SimpleImageAnalysisbyMoments.pdf. Accessed: Nov. 27, 2016.</a:t>
+            </a:r>
+          </a:p>
+          <a:p>
+            <a:r>
+              <a:rPr lang="en-US" sz="2400" dirty="0" smtClean="0"/>
+              <a:t>[2] </a:t>
+            </a:r>
+            <a:r>
+              <a:rPr lang="en-US" sz="2400" dirty="0" err="1" smtClean="0"/>
+              <a:t>Ruslan</a:t>
+            </a:r>
+            <a:r>
+              <a:rPr lang="en-US" sz="2400" dirty="0" smtClean="0"/>
+              <a:t> </a:t>
+            </a:r>
+            <a:r>
+              <a:rPr lang="en-US" sz="2400" dirty="0" err="1" smtClean="0"/>
+              <a:t>Kurdyumov</a:t>
+            </a:r>
+            <a:r>
+              <a:rPr lang="en-US" sz="2400" dirty="0" smtClean="0"/>
+              <a:t> and Phillip Ho Justin Ng, "Sign Language Classification Using Webcam Images. [Online]. Available: http://cs229.stanford.edu/proj 2011/</a:t>
+            </a:r>
+            <a:r>
+              <a:rPr lang="en-US" sz="2400" dirty="0" err="1" smtClean="0"/>
+              <a:t>KurdyumovHoNgSign</a:t>
+            </a:r>
+            <a:endParaRPr lang="en-US" sz="2400" dirty="0" smtClean="0"/>
+          </a:p>
+          <a:p>
+            <a:r>
+              <a:rPr lang="en-US" sz="2400" dirty="0" err="1" smtClean="0"/>
+              <a:t>LanguageClassificationUsing</a:t>
+            </a:r>
+            <a:r>
+              <a:rPr lang="en-US" sz="2400" dirty="0" smtClean="0"/>
+              <a:t> WebcamImages.pdf. Accessed: Nov. 22, 2016.</a:t>
+            </a:r>
+          </a:p>
+          <a:p>
+            <a:r>
+              <a:rPr lang="en-US" sz="2400" dirty="0" smtClean="0"/>
+              <a:t>[3] </a:t>
+            </a:r>
+            <a:r>
+              <a:rPr lang="en-US" sz="2400" dirty="0" err="1" smtClean="0"/>
+              <a:t>Erdem</a:t>
+            </a:r>
+            <a:r>
+              <a:rPr lang="en-US" sz="2400" dirty="0" smtClean="0"/>
+              <a:t> </a:t>
+            </a:r>
+            <a:r>
+              <a:rPr lang="en-US" sz="2400" dirty="0" err="1" smtClean="0"/>
+              <a:t>Yörük</a:t>
+            </a:r>
+            <a:r>
+              <a:rPr lang="en-US" sz="2400" dirty="0" smtClean="0"/>
+              <a:t>, Ender </a:t>
+            </a:r>
+            <a:r>
+              <a:rPr lang="en-US" sz="2400" dirty="0" err="1" smtClean="0"/>
+              <a:t>Konukoglu</a:t>
+            </a:r>
+            <a:r>
+              <a:rPr lang="en-US" sz="2400" dirty="0" smtClean="0"/>
+              <a:t>, and </a:t>
+            </a:r>
+            <a:r>
+              <a:rPr lang="en-US" sz="2400" dirty="0" err="1" smtClean="0"/>
+              <a:t>Bülent</a:t>
+            </a:r>
+            <a:r>
+              <a:rPr lang="en-US" sz="2400" dirty="0" smtClean="0"/>
+              <a:t> </a:t>
+            </a:r>
+            <a:r>
+              <a:rPr lang="en-US" sz="2400" dirty="0" err="1" smtClean="0"/>
+              <a:t>Sankur</a:t>
+            </a:r>
+            <a:r>
+              <a:rPr lang="en-US" sz="2400" dirty="0" smtClean="0"/>
+              <a:t>, "Shape-Based Hand Recognition. [Online]. Available: http://www.busim</a:t>
+            </a:r>
+          </a:p>
+          <a:p>
             <a:r>
               <a:rPr lang="en-US" sz="2400" dirty="0" smtClean="0"/>
               <a:t>.</a:t>
             </a:r>
-            <a:endParaRPr lang="en-US" sz="2400" dirty="0" smtClean="0"/>
-          </a:p>
-          <a:p>
-            <a:r>
-              <a:rPr lang="en-US" sz="2400" dirty="0" smtClean="0"/>
-              <a:t>[2] </a:t>
-            </a:r>
-            <a:r>
-              <a:rPr lang="en-US" sz="2400" dirty="0" err="1" smtClean="0"/>
-              <a:t>Ruslan</a:t>
-            </a:r>
-            <a:r>
-              <a:rPr lang="en-US" sz="2400" dirty="0" smtClean="0"/>
-              <a:t> </a:t>
-            </a:r>
-            <a:r>
-              <a:rPr lang="en-US" sz="2400" dirty="0" err="1" smtClean="0"/>
-              <a:t>Kurdyumov</a:t>
-            </a:r>
-            <a:r>
-              <a:rPr lang="en-US" sz="2400" dirty="0" smtClean="0"/>
-              <a:t> and Phillip Ho Justin Ng, "Sign Language Classification Using Webcam Images. [Online]. Available: http://cs229.stanford.edu/proj 2011/</a:t>
-            </a:r>
-            <a:r>
-              <a:rPr lang="en-US" sz="2400" dirty="0" err="1" smtClean="0"/>
-              <a:t>KurdyumovHoNgSign</a:t>
-            </a:r>
-            <a:endParaRPr lang="en-US" sz="2400" dirty="0" smtClean="0"/>
-          </a:p>
-          <a:p>
-            <a:r>
-              <a:rPr lang="en-US" sz="2400" dirty="0" err="1" smtClean="0"/>
-              <a:t>LanguageClassificationUsing</a:t>
-            </a:r>
-            <a:r>
-              <a:rPr lang="en-US" sz="2400" dirty="0" smtClean="0"/>
-              <a:t> WebcamImages.pdf. Accessed: Nov. 22, 2016</a:t>
-            </a:r>
-            <a:r>
-              <a:rPr lang="en-US" sz="2400" dirty="0" smtClean="0"/>
-              <a:t>.</a:t>
-            </a:r>
-            <a:endParaRPr lang="en-US" sz="2400" dirty="0" smtClean="0"/>
-          </a:p>
-          <a:p>
-            <a:r>
-              <a:rPr lang="en-US" sz="2400" dirty="0" smtClean="0"/>
-              <a:t>[3] </a:t>
-            </a:r>
-            <a:r>
-              <a:rPr lang="en-US" sz="2400" dirty="0" err="1" smtClean="0"/>
-              <a:t>Erdem</a:t>
-            </a:r>
-            <a:r>
-              <a:rPr lang="en-US" sz="2400" dirty="0" smtClean="0"/>
-              <a:t> </a:t>
-            </a:r>
-            <a:r>
-              <a:rPr lang="en-US" sz="2400" dirty="0" err="1" smtClean="0"/>
-              <a:t>Yörük</a:t>
-            </a:r>
-            <a:r>
-              <a:rPr lang="en-US" sz="2400" dirty="0" smtClean="0"/>
-              <a:t>, Ender </a:t>
-            </a:r>
-            <a:r>
-              <a:rPr lang="en-US" sz="2400" dirty="0" err="1" smtClean="0"/>
-              <a:t>Konukoglu</a:t>
-            </a:r>
-            <a:r>
-              <a:rPr lang="en-US" sz="2400" dirty="0" smtClean="0"/>
-              <a:t>, and </a:t>
-            </a:r>
-            <a:r>
-              <a:rPr lang="en-US" sz="2400" dirty="0" err="1" smtClean="0"/>
-              <a:t>Bülent</a:t>
-            </a:r>
-            <a:r>
-              <a:rPr lang="en-US" sz="2400" dirty="0" smtClean="0"/>
-              <a:t> </a:t>
-            </a:r>
-            <a:r>
-              <a:rPr lang="en-US" sz="2400" dirty="0" err="1" smtClean="0"/>
-              <a:t>Sankur</a:t>
-            </a:r>
-            <a:r>
-              <a:rPr lang="en-US" sz="2400" dirty="0" smtClean="0"/>
-              <a:t>, "Shape-Based Hand Recognition. [Online]. Available: http://www.busim</a:t>
-            </a:r>
-          </a:p>
-          <a:p>
-            <a:r>
-              <a:rPr lang="en-US" sz="2400" dirty="0" smtClean="0"/>
-              <a:t>.</a:t>
-            </a:r>
             <a:r>
               <a:rPr lang="en-US" sz="2400" dirty="0" err="1" smtClean="0"/>
               <a:t>ee.boun.edu.tr</a:t>
@@ -4498,13 +4412,8 @@
           <a:p>
             <a:r>
               <a:rPr lang="en-US" sz="2400" dirty="0" smtClean="0"/>
-              <a:t>_Recognition.pdf. Accessed: Nov. 24, 2016</a:t>
-            </a:r>
-            <a:r>
-              <a:rPr lang="en-US" sz="2400" dirty="0" smtClean="0"/>
-              <a:t>.</a:t>
-            </a:r>
-            <a:endParaRPr lang="en-US" sz="2400" dirty="0" smtClean="0"/>
+              <a:t>_Recognition.pdf. Accessed: Nov. 24, 2016.</a:t>
+            </a:r>
           </a:p>
           <a:p>
             <a:r>
@@ -4531,13 +4440,8 @@
           <a:p>
             <a:r>
               <a:rPr lang="en-US" sz="2400" dirty="0" smtClean="0"/>
-              <a:t>papers/paper_128.pdf. Accessed: Nov. 25, 2016</a:t>
-            </a:r>
-            <a:r>
-              <a:rPr lang="en-US" sz="2400" dirty="0" smtClean="0"/>
-              <a:t>.</a:t>
-            </a:r>
-            <a:endParaRPr lang="en-US" sz="2400" dirty="0" smtClean="0"/>
+              <a:t>papers/paper_128.pdf. Accessed: Nov. 25, 2016.</a:t>
+            </a:r>
           </a:p>
           <a:p>
             <a:r>
@@ -4697,43 +4601,73 @@
             </a:r>
             <a:r>
               <a:rPr lang="en-US" sz="2400" dirty="0" smtClean="0"/>
-              <a:t>System Integrates Multiple Feature Vectors for Improved Functionality</a:t>
-            </a:r>
-          </a:p>
-          <a:p>
-            <a:pPr>
-              <a:defRPr/>
-            </a:pPr>
+              <a:t>system </a:t>
+            </a:r>
+            <a:r>
+              <a:rPr lang="en-US" sz="2400" dirty="0"/>
+              <a:t>i</a:t>
+            </a:r>
             <a:r>
               <a:rPr lang="en-US" sz="2400" dirty="0" smtClean="0"/>
-              <a:t>Spatial </a:t>
+              <a:t>ntegrates multiple feature vectors </a:t>
             </a:r>
             <a:r>
               <a:rPr lang="en-US" sz="2400" dirty="0" smtClean="0"/>
-              <a:t>and Spectral </a:t>
+              <a:t>for </a:t>
+            </a:r>
+            <a:r>
+              <a:rPr lang="en-US" sz="2400" dirty="0"/>
+              <a:t>i</a:t>
             </a:r>
             <a:r>
               <a:rPr lang="en-US" sz="2400" dirty="0" smtClean="0"/>
-              <a:t>properties for better classification </a:t>
+              <a:t>mproved functionality. The system also utilizes spatial </a:t>
             </a:r>
             <a:r>
               <a:rPr lang="en-US" sz="2400" dirty="0" smtClean="0"/>
-              <a:t>of the Sign Image.</a:t>
-            </a:r>
-            <a:endParaRPr lang="en-US" sz="2400" dirty="0"/>
-          </a:p>
-          <a:p>
-            <a:pPr>
-              <a:defRPr/>
-            </a:pPr>
+              <a:t>and </a:t>
+            </a:r>
             <a:r>
               <a:rPr lang="en-US" sz="2400" dirty="0" smtClean="0"/>
-              <a:t>Complex Fourier Coefficients represented as Real spectrum Indicators</a:t>
+              <a:t>spectral </a:t>
             </a:r>
             <a:r>
               <a:rPr lang="en-US" sz="2400" dirty="0" smtClean="0"/>
-              <a:t>..</a:t>
-            </a:r>
+              <a:t>properties for better classification of the </a:t>
+            </a:r>
+            <a:r>
+              <a:rPr lang="en-US" sz="2400" dirty="0" smtClean="0"/>
+              <a:t>sign image.</a:t>
+            </a:r>
+            <a:r>
+              <a:rPr lang="en-US" sz="2400" dirty="0"/>
+              <a:t> </a:t>
+            </a:r>
+            <a:r>
+              <a:rPr lang="en-US" sz="2400" dirty="0" smtClean="0"/>
+              <a:t>The c</a:t>
+            </a:r>
+            <a:r>
+              <a:rPr lang="en-US" sz="2400" dirty="0" smtClean="0"/>
+              <a:t>omplex Fourier coefficients are also represented </a:t>
+            </a:r>
+            <a:r>
+              <a:rPr lang="en-US" sz="2400" dirty="0" smtClean="0"/>
+              <a:t>as </a:t>
+            </a:r>
+            <a:r>
+              <a:rPr lang="en-US" sz="2400" dirty="0" smtClean="0"/>
+              <a:t>real </a:t>
+            </a:r>
+            <a:r>
+              <a:rPr lang="en-US" sz="2400" dirty="0" smtClean="0"/>
+              <a:t>spectrum </a:t>
+            </a:r>
+            <a:r>
+              <a:rPr lang="en-US" sz="2400" dirty="0" smtClean="0"/>
+              <a:t>indicators.</a:t>
+            </a:r>
+            <a:endParaRPr lang="en-US" sz="2400" dirty="0" smtClean="0"/>
           </a:p>
           <a:p>
             <a:pPr>
@@ -4928,24 +4862,15 @@
             </a:pPr>
             <a:r>
               <a:rPr lang="en-US" sz="2400" dirty="0" smtClean="0"/>
-              <a:t>This </a:t>
+              <a:t>This paper focused on the use of multiple feature vector selection and their use for discriminating between sign language characters. The feature vectors were not computationally challenging and could be used in unison to narrow down the selection process to greatly increase the estimation results of the system. The results show that using a multitude of easily computed vectors over a single, computationally-challenging feature vector is both viable and </a:t>
             </a:r>
             <a:r>
               <a:rPr lang="en-US" sz="2400" dirty="0" smtClean="0"/>
-              <a:t>paper focused on the use of multiple feature vector selection and their use for discriminating between sign language characters. The feature vectors were not computationally challenging and could be used in unison to narrow down the selection process to greatly increase the estimation results of the system. The results show that using a multitude of easily computed vectors over a single, computationally-challenging feature vector is both viable and practical.</a:t>
-            </a:r>
-          </a:p>
-          <a:p>
-            <a:pPr algn="just">
-              <a:defRPr/>
-            </a:pPr>
+              <a:t>practical. Further </a:t>
+            </a:r>
             <a:r>
               <a:rPr lang="en-US" sz="2400" dirty="0" smtClean="0"/>
-              <a:t>.</a:t>
-            </a:r>
-            <a:r>
-              <a:rPr lang="en-US" sz="2400" dirty="0" smtClean="0"/>
-              <a:t> Further work includes injecting real-world inputs in place of the synthetic images, compensation for orientation/angle errors on input images, and the addition of more feature vectors to aid in improving the discrimination estimation made by the overall system.</a:t>
+              <a:t>work includes injecting real-world inputs in place of the synthetic images, compensation for orientation/angle errors on input images, and the addition of more feature vectors to aid in improving the discrimination estimation made by the overall system.</a:t>
             </a:r>
           </a:p>
           <a:p>
@@ -5183,7 +5108,7 @@
         </p:blipFill>
         <p:spPr bwMode="auto">
           <a:xfrm>
-            <a:off x="26974800" y="7696200"/>
+            <a:off x="26932690" y="7625304"/>
             <a:ext cx="6967641" cy="3124200"/>
           </a:xfrm>
           <a:prstGeom prst="rect">
@@ -5740,7 +5665,7 @@
           <a:blip r:embed="rId10" cstate="print">
             <a:extLst>
               <a:ext uri="{28A0092B-C50C-407E-A947-70E740481C1C}">
-                <a14:useLocalDpi xmlns:a14="http://schemas.microsoft.com/office/drawing/2010/main" xmlns="" val="0"/>
+                <a14:useLocalDpi xmlns:a14="http://schemas.microsoft.com/office/drawing/2010/main" val="0"/>
               </a:ext>
             </a:extLst>
           </a:blip>
@@ -5763,14 +5688,14 @@
           </a:ln>
           <a:extLst>
             <a:ext uri="{909E8E84-426E-40DD-AFC4-6F175D3DCCD1}">
-              <a14:hiddenFill xmlns:a14="http://schemas.microsoft.com/office/drawing/2010/main" xmlns="">
+              <a14:hiddenFill xmlns:a14="http://schemas.microsoft.com/office/drawing/2010/main">
                 <a:solidFill>
                   <a:schemeClr val="accent1"/>
                 </a:solidFill>
               </a14:hiddenFill>
             </a:ext>
             <a:ext uri="{91240B29-F687-4F45-9708-019B960494DF}">
-              <a14:hiddenLine xmlns:a14="http://schemas.microsoft.com/office/drawing/2010/main" xmlns="" w="9525">
+              <a14:hiddenLine xmlns:a14="http://schemas.microsoft.com/office/drawing/2010/main" w="9525">
                 <a:solidFill>
                   <a:schemeClr val="tx1"/>
                 </a:solidFill>
@@ -5819,11 +5744,7 @@
             </a:pPr>
             <a:r>
               <a:rPr lang="en-US" sz="2400" dirty="0" smtClean="0"/>
-              <a:t>Correlation Weig</a:t>
-            </a:r>
-            <a:r>
-              <a:rPr lang="en-US" sz="2400" dirty="0" smtClean="0"/>
-              <a:t>hts for  C Sign</a:t>
+              <a:t>Correlation Weights for  C Sign</a:t>
             </a:r>
             <a:endParaRPr lang="en-US" sz="2400" dirty="0"/>
           </a:p>

</xml_diff>